<commit_message>
Changed presentation, added gif
</commit_message>
<xml_diff>
--- a/Managment/Presentations/Presentation_Two.pptx
+++ b/Managment/Presentations/Presentation_Two.pptx
@@ -119,7 +119,7 @@
   </p:defaultTextStyle>
   <p:extLst>
     <p:ext uri="{EFAFB233-063F-42B5-8137-9DF3F51BA10A}">
-      <p15:sldGuideLst xmlns:p15="http://schemas.microsoft.com/office/powerpoint/2012/main"/>
+      <p15:sldGuideLst xmlns:p15="http://schemas.microsoft.com/office/powerpoint/2012/main" xmlns=""/>
     </p:ext>
   </p:extLst>
 </p:presentation>
@@ -207,6 +207,7 @@
           <a:p>
             <a:fld id="{8C2CEB21-1E96-472F-AA37-B731A44413DB}" type="datetimeFigureOut">
               <a:rPr lang="en-US"/>
+              <a:pPr/>
               <a:t>11/15/2016</a:t>
             </a:fld>
             <a:endParaRPr lang="en-US"/>
@@ -365,6 +366,7 @@
           <a:p>
             <a:fld id="{A75C1215-3F65-44DA-9477-5E2A345A9162}" type="slidenum">
               <a:rPr lang="en-US"/>
+              <a:pPr/>
               <a:t>‹#›</a:t>
             </a:fld>
             <a:endParaRPr lang="en-US"/>
@@ -374,7 +376,7 @@
     </p:spTree>
     <p:extLst>
       <p:ext uri="{BB962C8B-B14F-4D97-AF65-F5344CB8AC3E}">
-        <p14:creationId xmlns:p14="http://schemas.microsoft.com/office/powerpoint/2010/main" val="1"/>
+        <p14:creationId xmlns:p14="http://schemas.microsoft.com/office/powerpoint/2010/main" xmlns="" val="1"/>
       </p:ext>
     </p:extLst>
   </p:cSld>
@@ -519,10 +521,9 @@
           <a:lstStyle/>
           <a:p>
             <a:r>
-              <a:rPr lang="EN-US" err="1"/>
+              <a:rPr lang="en-US" err="1"/>
               <a:t>Callum</a:t>
             </a:r>
-            <a:endParaRPr lang="en-US" err="1"/>
           </a:p>
         </p:txBody>
       </p:sp>
@@ -543,6 +544,7 @@
           <a:p>
             <a:fld id="{A75C1215-3F65-44DA-9477-5E2A345A9162}" type="slidenum">
               <a:rPr lang="en-US"/>
+              <a:pPr/>
               <a:t>2</a:t>
             </a:fld>
             <a:endParaRPr lang="en-US"/>
@@ -552,7 +554,7 @@
     </p:spTree>
     <p:extLst>
       <p:ext uri="{BB962C8B-B14F-4D97-AF65-F5344CB8AC3E}">
-        <p14:creationId xmlns:p14="http://schemas.microsoft.com/office/powerpoint/2010/main" val="259217882"/>
+        <p14:creationId xmlns:p14="http://schemas.microsoft.com/office/powerpoint/2010/main" xmlns="" val="259217882"/>
       </p:ext>
     </p:extLst>
   </p:cSld>
@@ -627,6 +629,7 @@
           <a:p>
             <a:fld id="{A75C1215-3F65-44DA-9477-5E2A345A9162}" type="slidenum">
               <a:rPr lang="en-US"/>
+              <a:pPr/>
               <a:t>11</a:t>
             </a:fld>
             <a:endParaRPr lang="en-US"/>
@@ -636,7 +639,7 @@
     </p:spTree>
     <p:extLst>
       <p:ext uri="{BB962C8B-B14F-4D97-AF65-F5344CB8AC3E}">
-        <p14:creationId xmlns:p14="http://schemas.microsoft.com/office/powerpoint/2010/main" val="674440680"/>
+        <p14:creationId xmlns:p14="http://schemas.microsoft.com/office/powerpoint/2010/main" xmlns="" val="674440680"/>
       </p:ext>
     </p:extLst>
   </p:cSld>
@@ -691,10 +694,9 @@
           <a:lstStyle/>
           <a:p>
             <a:r>
-              <a:rPr lang="EN-US"/>
+              <a:rPr lang="en-US"/>
               <a:t>Mac(Jake cover) </a:t>
             </a:r>
-            <a:endParaRPr lang="en-US"/>
           </a:p>
         </p:txBody>
       </p:sp>
@@ -715,6 +717,7 @@
           <a:p>
             <a:fld id="{A75C1215-3F65-44DA-9477-5E2A345A9162}" type="slidenum">
               <a:rPr lang="en-US"/>
+              <a:pPr/>
               <a:t>3</a:t>
             </a:fld>
             <a:endParaRPr lang="en-US"/>
@@ -724,7 +727,7 @@
     </p:spTree>
     <p:extLst>
       <p:ext uri="{BB962C8B-B14F-4D97-AF65-F5344CB8AC3E}">
-        <p14:creationId xmlns:p14="http://schemas.microsoft.com/office/powerpoint/2010/main" val="796083437"/>
+        <p14:creationId xmlns:p14="http://schemas.microsoft.com/office/powerpoint/2010/main" xmlns="" val="796083437"/>
       </p:ext>
     </p:extLst>
   </p:cSld>
@@ -779,10 +782,9 @@
           <a:lstStyle/>
           <a:p>
             <a:r>
-              <a:rPr lang="EN-US" err="1"/>
+              <a:rPr lang="en-US" err="1"/>
               <a:t>Callum</a:t>
             </a:r>
-            <a:endParaRPr lang="en-US" err="1"/>
           </a:p>
         </p:txBody>
       </p:sp>
@@ -803,6 +805,7 @@
           <a:p>
             <a:fld id="{A75C1215-3F65-44DA-9477-5E2A345A9162}" type="slidenum">
               <a:rPr lang="en-US"/>
+              <a:pPr/>
               <a:t>4</a:t>
             </a:fld>
             <a:endParaRPr lang="en-US"/>
@@ -812,7 +815,7 @@
     </p:spTree>
     <p:extLst>
       <p:ext uri="{BB962C8B-B14F-4D97-AF65-F5344CB8AC3E}">
-        <p14:creationId xmlns:p14="http://schemas.microsoft.com/office/powerpoint/2010/main" val="2399666380"/>
+        <p14:creationId xmlns:p14="http://schemas.microsoft.com/office/powerpoint/2010/main" xmlns="" val="2399666380"/>
       </p:ext>
     </p:extLst>
   </p:cSld>
@@ -867,10 +870,9 @@
           <a:lstStyle/>
           <a:p>
             <a:r>
-              <a:rPr lang="EN-US"/>
+              <a:rPr lang="en-US"/>
               <a:t>Connor and Jake </a:t>
             </a:r>
-            <a:endParaRPr lang="en-US"/>
           </a:p>
         </p:txBody>
       </p:sp>
@@ -891,6 +893,7 @@
           <a:p>
             <a:fld id="{A75C1215-3F65-44DA-9477-5E2A345A9162}" type="slidenum">
               <a:rPr lang="en-US"/>
+              <a:pPr/>
               <a:t>5</a:t>
             </a:fld>
             <a:endParaRPr lang="en-US"/>
@@ -900,7 +903,7 @@
     </p:spTree>
     <p:extLst>
       <p:ext uri="{BB962C8B-B14F-4D97-AF65-F5344CB8AC3E}">
-        <p14:creationId xmlns:p14="http://schemas.microsoft.com/office/powerpoint/2010/main" val="889293474"/>
+        <p14:creationId xmlns:p14="http://schemas.microsoft.com/office/powerpoint/2010/main" xmlns="" val="889293474"/>
       </p:ext>
     </p:extLst>
   </p:cSld>
@@ -955,14 +958,13 @@
           <a:lstStyle/>
           <a:p>
             <a:r>
-              <a:rPr lang="EN-US" err="1"/>
+              <a:rPr lang="en-US" err="1"/>
               <a:t>Callum</a:t>
             </a:r>
             <a:r>
-              <a:rPr lang="EN-US"/>
+              <a:rPr lang="en-US"/>
               <a:t> and Jake</a:t>
             </a:r>
-            <a:endParaRPr lang="en-US"/>
           </a:p>
         </p:txBody>
       </p:sp>
@@ -983,6 +985,7 @@
           <a:p>
             <a:fld id="{A75C1215-3F65-44DA-9477-5E2A345A9162}" type="slidenum">
               <a:rPr lang="en-US"/>
+              <a:pPr/>
               <a:t>6</a:t>
             </a:fld>
             <a:endParaRPr lang="en-US"/>
@@ -992,7 +995,7 @@
     </p:spTree>
     <p:extLst>
       <p:ext uri="{BB962C8B-B14F-4D97-AF65-F5344CB8AC3E}">
-        <p14:creationId xmlns:p14="http://schemas.microsoft.com/office/powerpoint/2010/main" val="794135080"/>
+        <p14:creationId xmlns:p14="http://schemas.microsoft.com/office/powerpoint/2010/main" xmlns="" val="794135080"/>
       </p:ext>
     </p:extLst>
   </p:cSld>
@@ -1047,10 +1050,9 @@
           <a:lstStyle/>
           <a:p>
             <a:r>
-              <a:rPr lang="EN-US"/>
+              <a:rPr lang="en-US"/>
               <a:t>Connor </a:t>
             </a:r>
-            <a:endParaRPr lang="en-US"/>
           </a:p>
         </p:txBody>
       </p:sp>
@@ -1071,6 +1073,7 @@
           <a:p>
             <a:fld id="{A75C1215-3F65-44DA-9477-5E2A345A9162}" type="slidenum">
               <a:rPr lang="en-US"/>
+              <a:pPr/>
               <a:t>7</a:t>
             </a:fld>
             <a:endParaRPr lang="en-US"/>
@@ -1080,7 +1083,7 @@
     </p:spTree>
     <p:extLst>
       <p:ext uri="{BB962C8B-B14F-4D97-AF65-F5344CB8AC3E}">
-        <p14:creationId xmlns:p14="http://schemas.microsoft.com/office/powerpoint/2010/main" val="3292285590"/>
+        <p14:creationId xmlns:p14="http://schemas.microsoft.com/office/powerpoint/2010/main" xmlns="" val="3292285590"/>
       </p:ext>
     </p:extLst>
   </p:cSld>
@@ -1135,10 +1138,9 @@
           <a:lstStyle/>
           <a:p>
             <a:r>
-              <a:rPr lang="EN-US" err="1"/>
+              <a:rPr lang="en-US" err="1"/>
               <a:t>Callum</a:t>
             </a:r>
-            <a:endParaRPr lang="en-US" err="1"/>
           </a:p>
         </p:txBody>
       </p:sp>
@@ -1159,6 +1161,7 @@
           <a:p>
             <a:fld id="{A75C1215-3F65-44DA-9477-5E2A345A9162}" type="slidenum">
               <a:rPr lang="en-US"/>
+              <a:pPr/>
               <a:t>8</a:t>
             </a:fld>
             <a:endParaRPr lang="en-US"/>
@@ -1168,7 +1171,7 @@
     </p:spTree>
     <p:extLst>
       <p:ext uri="{BB962C8B-B14F-4D97-AF65-F5344CB8AC3E}">
-        <p14:creationId xmlns:p14="http://schemas.microsoft.com/office/powerpoint/2010/main" val="2195279137"/>
+        <p14:creationId xmlns:p14="http://schemas.microsoft.com/office/powerpoint/2010/main" xmlns="" val="2195279137"/>
       </p:ext>
     </p:extLst>
   </p:cSld>
@@ -1223,29 +1226,27 @@
           <a:lstStyle/>
           <a:p>
             <a:r>
-              <a:rPr lang="EN-US" err="1"/>
+              <a:rPr lang="en-US" err="1"/>
               <a:t>Callum</a:t>
             </a:r>
             <a:r>
-              <a:rPr lang="EN-US"/>
+              <a:rPr lang="en-US"/>
               <a:t> – Video </a:t>
             </a:r>
-            <a:endParaRPr lang="en-US"/>
-          </a:p>
-          <a:p>
-            <a:r>
-              <a:rPr lang="EN-US"/>
+          </a:p>
+          <a:p>
+            <a:r>
+              <a:rPr lang="en-US"/>
               <a:t>Connor(</a:t>
             </a:r>
             <a:r>
-              <a:rPr lang="EN-US" err="1"/>
+              <a:rPr lang="en-US" err="1"/>
               <a:t>Pis</a:t>
             </a:r>
             <a:r>
-              <a:rPr lang="EN-US"/>
+              <a:rPr lang="en-US"/>
               <a:t>/Gifs) </a:t>
             </a:r>
-            <a:endParaRPr lang="en-US"/>
           </a:p>
         </p:txBody>
       </p:sp>
@@ -1266,6 +1267,7 @@
           <a:p>
             <a:fld id="{A75C1215-3F65-44DA-9477-5E2A345A9162}" type="slidenum">
               <a:rPr lang="en-US"/>
+              <a:pPr/>
               <a:t>9</a:t>
             </a:fld>
             <a:endParaRPr lang="en-US"/>
@@ -1275,7 +1277,7 @@
     </p:spTree>
     <p:extLst>
       <p:ext uri="{BB962C8B-B14F-4D97-AF65-F5344CB8AC3E}">
-        <p14:creationId xmlns:p14="http://schemas.microsoft.com/office/powerpoint/2010/main" val="3095770500"/>
+        <p14:creationId xmlns:p14="http://schemas.microsoft.com/office/powerpoint/2010/main" xmlns="" val="3095770500"/>
       </p:ext>
     </p:extLst>
   </p:cSld>
@@ -1330,10 +1332,9 @@
           <a:lstStyle/>
           <a:p>
             <a:r>
-              <a:rPr lang="EN-US"/>
+              <a:rPr lang="en-US"/>
               <a:t>Connor </a:t>
             </a:r>
-            <a:endParaRPr lang="en-US"/>
           </a:p>
         </p:txBody>
       </p:sp>
@@ -1354,6 +1355,7 @@
           <a:p>
             <a:fld id="{A75C1215-3F65-44DA-9477-5E2A345A9162}" type="slidenum">
               <a:rPr lang="en-US"/>
+              <a:pPr/>
               <a:t>10</a:t>
             </a:fld>
             <a:endParaRPr lang="en-US"/>
@@ -1363,7 +1365,7 @@
     </p:spTree>
     <p:extLst>
       <p:ext uri="{BB962C8B-B14F-4D97-AF65-F5344CB8AC3E}">
-        <p14:creationId xmlns:p14="http://schemas.microsoft.com/office/powerpoint/2010/main" val="4094297821"/>
+        <p14:creationId xmlns:p14="http://schemas.microsoft.com/office/powerpoint/2010/main" xmlns="" val="4094297821"/>
       </p:ext>
     </p:extLst>
   </p:cSld>
@@ -1539,6 +1541,7 @@
           <a:p>
             <a:fld id="{846CE7D5-CF57-46EF-B807-FDD0502418D4}" type="datetimeFigureOut">
               <a:rPr lang="en-US" smtClean="0"/>
+              <a:pPr/>
               <a:t>11/15/2016</a:t>
             </a:fld>
             <a:endParaRPr lang="en-US"/>
@@ -1601,6 +1604,7 @@
           <a:p>
             <a:fld id="{330EA680-D336-4FF7-8B7A-9848BB0A1C32}" type="slidenum">
               <a:rPr lang="en-US" smtClean="0"/>
+              <a:pPr/>
               <a:t>‹#›</a:t>
             </a:fld>
             <a:endParaRPr lang="en-US"/>
@@ -1648,7 +1652,7 @@
     </p:spTree>
     <p:extLst>
       <p:ext uri="{BB962C8B-B14F-4D97-AF65-F5344CB8AC3E}">
-        <p14:creationId xmlns:p14="http://schemas.microsoft.com/office/powerpoint/2010/main" val="406208523"/>
+        <p14:creationId xmlns:p14="http://schemas.microsoft.com/office/powerpoint/2010/main" xmlns="" val="406208523"/>
       </p:ext>
     </p:extLst>
   </p:cSld>
@@ -1765,6 +1769,7 @@
           <a:p>
             <a:fld id="{846CE7D5-CF57-46EF-B807-FDD0502418D4}" type="datetimeFigureOut">
               <a:rPr lang="en-US" smtClean="0"/>
+              <a:pPr/>
               <a:t>11/15/2016</a:t>
             </a:fld>
             <a:endParaRPr lang="en-US"/>
@@ -1807,6 +1812,7 @@
           <a:p>
             <a:fld id="{330EA680-D336-4FF7-8B7A-9848BB0A1C32}" type="slidenum">
               <a:rPr lang="en-US" smtClean="0"/>
+              <a:pPr/>
               <a:t>‹#›</a:t>
             </a:fld>
             <a:endParaRPr lang="en-US"/>
@@ -1816,7 +1822,7 @@
     </p:spTree>
     <p:extLst>
       <p:ext uri="{BB962C8B-B14F-4D97-AF65-F5344CB8AC3E}">
-        <p14:creationId xmlns:p14="http://schemas.microsoft.com/office/powerpoint/2010/main" val="2608788775"/>
+        <p14:creationId xmlns:p14="http://schemas.microsoft.com/office/powerpoint/2010/main" xmlns="" val="2608788775"/>
       </p:ext>
     </p:extLst>
   </p:cSld>
@@ -1943,6 +1949,7 @@
           <a:p>
             <a:fld id="{846CE7D5-CF57-46EF-B807-FDD0502418D4}" type="datetimeFigureOut">
               <a:rPr lang="en-US" smtClean="0"/>
+              <a:pPr/>
               <a:t>11/15/2016</a:t>
             </a:fld>
             <a:endParaRPr lang="en-US"/>
@@ -1985,6 +1992,7 @@
           <a:p>
             <a:fld id="{330EA680-D336-4FF7-8B7A-9848BB0A1C32}" type="slidenum">
               <a:rPr lang="en-US" smtClean="0"/>
+              <a:pPr/>
               <a:t>‹#›</a:t>
             </a:fld>
             <a:endParaRPr lang="en-US"/>
@@ -1994,7 +2002,7 @@
     </p:spTree>
     <p:extLst>
       <p:ext uri="{BB962C8B-B14F-4D97-AF65-F5344CB8AC3E}">
-        <p14:creationId xmlns:p14="http://schemas.microsoft.com/office/powerpoint/2010/main" val="3611283943"/>
+        <p14:creationId xmlns:p14="http://schemas.microsoft.com/office/powerpoint/2010/main" xmlns="" val="3611283943"/>
       </p:ext>
     </p:extLst>
   </p:cSld>
@@ -2111,6 +2119,7 @@
           <a:p>
             <a:fld id="{846CE7D5-CF57-46EF-B807-FDD0502418D4}" type="datetimeFigureOut">
               <a:rPr lang="en-US" smtClean="0"/>
+              <a:pPr/>
               <a:t>11/15/2016</a:t>
             </a:fld>
             <a:endParaRPr lang="en-US"/>
@@ -2153,6 +2162,7 @@
           <a:p>
             <a:fld id="{330EA680-D336-4FF7-8B7A-9848BB0A1C32}" type="slidenum">
               <a:rPr lang="en-US" smtClean="0"/>
+              <a:pPr/>
               <a:t>‹#›</a:t>
             </a:fld>
             <a:endParaRPr lang="en-US"/>
@@ -2162,7 +2172,7 @@
     </p:spTree>
     <p:extLst>
       <p:ext uri="{BB962C8B-B14F-4D97-AF65-F5344CB8AC3E}">
-        <p14:creationId xmlns:p14="http://schemas.microsoft.com/office/powerpoint/2010/main" val="2394052234"/>
+        <p14:creationId xmlns:p14="http://schemas.microsoft.com/office/powerpoint/2010/main" xmlns="" val="2394052234"/>
       </p:ext>
     </p:extLst>
   </p:cSld>
@@ -2364,6 +2374,7 @@
           <a:p>
             <a:fld id="{846CE7D5-CF57-46EF-B807-FDD0502418D4}" type="datetimeFigureOut">
               <a:rPr lang="en-US" smtClean="0"/>
+              <a:pPr/>
               <a:t>11/15/2016</a:t>
             </a:fld>
             <a:endParaRPr lang="en-US"/>
@@ -2406,6 +2417,7 @@
           <a:p>
             <a:fld id="{330EA680-D336-4FF7-8B7A-9848BB0A1C32}" type="slidenum">
               <a:rPr lang="en-US" smtClean="0"/>
+              <a:pPr/>
               <a:t>‹#›</a:t>
             </a:fld>
             <a:endParaRPr lang="en-US"/>
@@ -2453,7 +2465,7 @@
     </p:spTree>
     <p:extLst>
       <p:ext uri="{BB962C8B-B14F-4D97-AF65-F5344CB8AC3E}">
-        <p14:creationId xmlns:p14="http://schemas.microsoft.com/office/powerpoint/2010/main" val="759264092"/>
+        <p14:creationId xmlns:p14="http://schemas.microsoft.com/office/powerpoint/2010/main" xmlns="" val="759264092"/>
       </p:ext>
     </p:extLst>
   </p:cSld>
@@ -2687,6 +2699,7 @@
           <a:p>
             <a:fld id="{846CE7D5-CF57-46EF-B807-FDD0502418D4}" type="datetimeFigureOut">
               <a:rPr lang="en-US" smtClean="0"/>
+              <a:pPr/>
               <a:t>11/15/2016</a:t>
             </a:fld>
             <a:endParaRPr lang="en-US"/>
@@ -2729,6 +2742,7 @@
           <a:p>
             <a:fld id="{330EA680-D336-4FF7-8B7A-9848BB0A1C32}" type="slidenum">
               <a:rPr lang="en-US" smtClean="0"/>
+              <a:pPr/>
               <a:t>‹#›</a:t>
             </a:fld>
             <a:endParaRPr lang="en-US"/>
@@ -2738,7 +2752,7 @@
     </p:spTree>
     <p:extLst>
       <p:ext uri="{BB962C8B-B14F-4D97-AF65-F5344CB8AC3E}">
-        <p14:creationId xmlns:p14="http://schemas.microsoft.com/office/powerpoint/2010/main" val="3618527769"/>
+        <p14:creationId xmlns:p14="http://schemas.microsoft.com/office/powerpoint/2010/main" xmlns="" val="3618527769"/>
       </p:ext>
     </p:extLst>
   </p:cSld>
@@ -3135,6 +3149,7 @@
           <a:p>
             <a:fld id="{846CE7D5-CF57-46EF-B807-FDD0502418D4}" type="datetimeFigureOut">
               <a:rPr lang="en-US" smtClean="0"/>
+              <a:pPr/>
               <a:t>11/15/2016</a:t>
             </a:fld>
             <a:endParaRPr lang="en-US"/>
@@ -3177,6 +3192,7 @@
           <a:p>
             <a:fld id="{330EA680-D336-4FF7-8B7A-9848BB0A1C32}" type="slidenum">
               <a:rPr lang="en-US" smtClean="0"/>
+              <a:pPr/>
               <a:t>‹#›</a:t>
             </a:fld>
             <a:endParaRPr lang="en-US"/>
@@ -3186,7 +3202,7 @@
     </p:spTree>
     <p:extLst>
       <p:ext uri="{BB962C8B-B14F-4D97-AF65-F5344CB8AC3E}">
-        <p14:creationId xmlns:p14="http://schemas.microsoft.com/office/powerpoint/2010/main" val="1254783651"/>
+        <p14:creationId xmlns:p14="http://schemas.microsoft.com/office/powerpoint/2010/main" xmlns="" val="1254783651"/>
       </p:ext>
     </p:extLst>
   </p:cSld>
@@ -3252,6 +3268,7 @@
           <a:p>
             <a:fld id="{846CE7D5-CF57-46EF-B807-FDD0502418D4}" type="datetimeFigureOut">
               <a:rPr lang="en-US" smtClean="0"/>
+              <a:pPr/>
               <a:t>11/15/2016</a:t>
             </a:fld>
             <a:endParaRPr lang="en-US"/>
@@ -3294,6 +3311,7 @@
           <a:p>
             <a:fld id="{330EA680-D336-4FF7-8B7A-9848BB0A1C32}" type="slidenum">
               <a:rPr lang="en-US" smtClean="0"/>
+              <a:pPr/>
               <a:t>‹#›</a:t>
             </a:fld>
             <a:endParaRPr lang="en-US"/>
@@ -3303,7 +3321,7 @@
     </p:spTree>
     <p:extLst>
       <p:ext uri="{BB962C8B-B14F-4D97-AF65-F5344CB8AC3E}">
-        <p14:creationId xmlns:p14="http://schemas.microsoft.com/office/powerpoint/2010/main" val="2454600789"/>
+        <p14:creationId xmlns:p14="http://schemas.microsoft.com/office/powerpoint/2010/main" xmlns="" val="2454600789"/>
       </p:ext>
     </p:extLst>
   </p:cSld>
@@ -3347,6 +3365,7 @@
           <a:p>
             <a:fld id="{846CE7D5-CF57-46EF-B807-FDD0502418D4}" type="datetimeFigureOut">
               <a:rPr lang="en-US" smtClean="0"/>
+              <a:pPr/>
               <a:t>11/15/2016</a:t>
             </a:fld>
             <a:endParaRPr lang="en-US"/>
@@ -3389,6 +3408,7 @@
           <a:p>
             <a:fld id="{330EA680-D336-4FF7-8B7A-9848BB0A1C32}" type="slidenum">
               <a:rPr lang="en-US" smtClean="0"/>
+              <a:pPr/>
               <a:t>‹#›</a:t>
             </a:fld>
             <a:endParaRPr lang="en-US"/>
@@ -3398,7 +3418,7 @@
     </p:spTree>
     <p:extLst>
       <p:ext uri="{BB962C8B-B14F-4D97-AF65-F5344CB8AC3E}">
-        <p14:creationId xmlns:p14="http://schemas.microsoft.com/office/powerpoint/2010/main" val="3120426024"/>
+        <p14:creationId xmlns:p14="http://schemas.microsoft.com/office/powerpoint/2010/main" xmlns="" val="3120426024"/>
       </p:ext>
     </p:extLst>
   </p:cSld>
@@ -3632,6 +3652,7 @@
           <a:p>
             <a:fld id="{846CE7D5-CF57-46EF-B807-FDD0502418D4}" type="datetimeFigureOut">
               <a:rPr lang="en-US" smtClean="0"/>
+              <a:pPr/>
               <a:t>11/15/2016</a:t>
             </a:fld>
             <a:endParaRPr lang="en-US"/>
@@ -3674,6 +3695,7 @@
           <a:p>
             <a:fld id="{330EA680-D336-4FF7-8B7A-9848BB0A1C32}" type="slidenum">
               <a:rPr lang="en-US" smtClean="0"/>
+              <a:pPr/>
               <a:t>‹#›</a:t>
             </a:fld>
             <a:endParaRPr lang="en-US"/>
@@ -3683,7 +3705,7 @@
     </p:spTree>
     <p:extLst>
       <p:ext uri="{BB962C8B-B14F-4D97-AF65-F5344CB8AC3E}">
-        <p14:creationId xmlns:p14="http://schemas.microsoft.com/office/powerpoint/2010/main" val="3660668002"/>
+        <p14:creationId xmlns:p14="http://schemas.microsoft.com/office/powerpoint/2010/main" xmlns="" val="3660668002"/>
       </p:ext>
     </p:extLst>
   </p:cSld>
@@ -3955,6 +3977,7 @@
           <a:p>
             <a:fld id="{846CE7D5-CF57-46EF-B807-FDD0502418D4}" type="datetimeFigureOut">
               <a:rPr lang="en-US" smtClean="0"/>
+              <a:pPr/>
               <a:t>11/15/2016</a:t>
             </a:fld>
             <a:endParaRPr lang="en-US"/>
@@ -3997,6 +4020,7 @@
           <a:p>
             <a:fld id="{330EA680-D336-4FF7-8B7A-9848BB0A1C32}" type="slidenum">
               <a:rPr lang="en-US" smtClean="0"/>
+              <a:pPr/>
               <a:t>‹#›</a:t>
             </a:fld>
             <a:endParaRPr lang="en-US"/>
@@ -4006,7 +4030,7 @@
     </p:spTree>
     <p:extLst>
       <p:ext uri="{BB962C8B-B14F-4D97-AF65-F5344CB8AC3E}">
-        <p14:creationId xmlns:p14="http://schemas.microsoft.com/office/powerpoint/2010/main" val="1612891514"/>
+        <p14:creationId xmlns:p14="http://schemas.microsoft.com/office/powerpoint/2010/main" xmlns="" val="1612891514"/>
       </p:ext>
     </p:extLst>
   </p:cSld>
@@ -4207,6 +4231,7 @@
           <a:p>
             <a:fld id="{846CE7D5-CF57-46EF-B807-FDD0502418D4}" type="datetimeFigureOut">
               <a:rPr lang="en-US" smtClean="0"/>
+              <a:pPr/>
               <a:t>11/15/2016</a:t>
             </a:fld>
             <a:endParaRPr lang="en-US"/>
@@ -4289,6 +4314,7 @@
           <a:p>
             <a:fld id="{330EA680-D336-4FF7-8B7A-9848BB0A1C32}" type="slidenum">
               <a:rPr lang="en-US" smtClean="0"/>
+              <a:pPr/>
               <a:t>‹#›</a:t>
             </a:fld>
             <a:endParaRPr lang="en-US"/>
@@ -4298,7 +4324,7 @@
     </p:spTree>
     <p:extLst>
       <p:ext uri="{BB962C8B-B14F-4D97-AF65-F5344CB8AC3E}">
-        <p14:creationId xmlns:p14="http://schemas.microsoft.com/office/powerpoint/2010/main" val="559208841"/>
+        <p14:creationId xmlns:p14="http://schemas.microsoft.com/office/powerpoint/2010/main" xmlns="" val="559208841"/>
       </p:ext>
     </p:extLst>
   </p:cSld>
@@ -4711,10 +4737,9 @@
           <a:lstStyle/>
           <a:p>
             <a:r>
-              <a:rPr lang="EN-US"/>
+              <a:rPr lang="en-US"/>
               <a:t>Game's name (TBA) </a:t>
             </a:r>
-            <a:endParaRPr lang="en-US"/>
           </a:p>
         </p:txBody>
       </p:sp>
@@ -4736,23 +4761,29 @@
           <a:lstStyle/>
           <a:p>
             <a:r>
-              <a:rPr lang="EN-US"/>
+              <a:rPr lang="en-US"/>
               <a:t>Level 4/5 Group 15 </a:t>
             </a:r>
-            <a:endParaRPr lang="en-US"/>
           </a:p>
         </p:txBody>
       </p:sp>
     </p:spTree>
     <p:extLst>
       <p:ext uri="{BB962C8B-B14F-4D97-AF65-F5344CB8AC3E}">
-        <p14:creationId xmlns:p14="http://schemas.microsoft.com/office/powerpoint/2010/main" val="109857222"/>
+        <p14:creationId xmlns:p14="http://schemas.microsoft.com/office/powerpoint/2010/main" xmlns="" val="109857222"/>
       </p:ext>
     </p:extLst>
   </p:cSld>
   <p:clrMapOvr>
     <a:masterClrMapping/>
   </p:clrMapOvr>
+  <p:timing>
+    <p:tnLst>
+      <p:par>
+        <p:cTn id="1" dur="indefinite" restart="never" nodeType="tmRoot"/>
+      </p:par>
+    </p:tnLst>
+  </p:timing>
 </p:sld>
 </file>
 
@@ -4790,10 +4821,9 @@
           <a:p>
             <a:pPr algn="ctr"/>
             <a:r>
-              <a:rPr lang="EN-US"/>
+              <a:rPr lang="en-US"/>
               <a:t>Future plans </a:t>
             </a:r>
-            <a:endParaRPr lang="en-US"/>
           </a:p>
         </p:txBody>
       </p:sp>
@@ -4812,20 +4842,56 @@
           <a:bodyPr/>
           <a:lstStyle/>
           <a:p>
-            <a:endParaRPr lang="en-US"/>
+            <a:r>
+              <a:rPr lang="en-US" dirty="0" smtClean="0"/>
+              <a:t>Instantiate new files for each level</a:t>
+            </a:r>
+          </a:p>
+          <a:p>
+            <a:r>
+              <a:rPr lang="en-US" dirty="0" smtClean="0"/>
+              <a:t>Add narrative email </a:t>
+            </a:r>
+            <a:r>
+              <a:rPr lang="en-US" dirty="0" err="1" smtClean="0"/>
+              <a:t>popups</a:t>
+            </a:r>
+            <a:r>
+              <a:rPr lang="en-US" dirty="0" smtClean="0"/>
+              <a:t> at points throughout the level</a:t>
+            </a:r>
+          </a:p>
+          <a:p>
+            <a:r>
+              <a:rPr lang="en-US" dirty="0" smtClean="0"/>
+              <a:t>Add animation triggers to code</a:t>
+            </a:r>
+          </a:p>
+          <a:p>
+            <a:r>
+              <a:rPr lang="en-US" dirty="0" smtClean="0"/>
+              <a:t>Have new types of folders appear at various points during the level</a:t>
+            </a:r>
           </a:p>
         </p:txBody>
       </p:sp>
     </p:spTree>
     <p:extLst>
       <p:ext uri="{BB962C8B-B14F-4D97-AF65-F5344CB8AC3E}">
-        <p14:creationId xmlns:p14="http://schemas.microsoft.com/office/powerpoint/2010/main" val="3920715391"/>
+        <p14:creationId xmlns:p14="http://schemas.microsoft.com/office/powerpoint/2010/main" xmlns="" val="3920715391"/>
       </p:ext>
     </p:extLst>
   </p:cSld>
   <p:clrMapOvr>
     <a:masterClrMapping/>
   </p:clrMapOvr>
+  <p:timing>
+    <p:tnLst>
+      <p:par>
+        <p:cTn id="1" dur="indefinite" restart="never" nodeType="tmRoot"/>
+      </p:par>
+    </p:tnLst>
+  </p:timing>
 </p:sld>
 </file>
 
@@ -4863,10 +4929,14 @@
           <a:p>
             <a:pPr algn="ctr"/>
             <a:r>
-              <a:rPr lang="EN-US"/>
-              <a:t>Any questions </a:t>
-            </a:r>
-            <a:endParaRPr lang="en-US"/>
+              <a:rPr lang="en-US" dirty="0"/>
+              <a:t>Any </a:t>
+            </a:r>
+            <a:r>
+              <a:rPr lang="en-US" dirty="0" smtClean="0"/>
+              <a:t>questions?</a:t>
+            </a:r>
+            <a:endParaRPr lang="en-US" dirty="0"/>
           </a:p>
         </p:txBody>
       </p:sp>
@@ -4885,20 +4955,27 @@
           <a:bodyPr/>
           <a:lstStyle/>
           <a:p>
-            <a:endParaRPr lang="en-US"/>
+            <a:endParaRPr lang="en-US" dirty="0"/>
           </a:p>
         </p:txBody>
       </p:sp>
     </p:spTree>
     <p:extLst>
       <p:ext uri="{BB962C8B-B14F-4D97-AF65-F5344CB8AC3E}">
-        <p14:creationId xmlns:p14="http://schemas.microsoft.com/office/powerpoint/2010/main" val="3209140307"/>
+        <p14:creationId xmlns:p14="http://schemas.microsoft.com/office/powerpoint/2010/main" xmlns="" val="3209140307"/>
       </p:ext>
     </p:extLst>
   </p:cSld>
   <p:clrMapOvr>
     <a:masterClrMapping/>
   </p:clrMapOvr>
+  <p:timing>
+    <p:tnLst>
+      <p:par>
+        <p:cTn id="1" dur="indefinite" restart="never" nodeType="tmRoot"/>
+      </p:par>
+    </p:tnLst>
+  </p:timing>
 </p:sld>
 </file>
 
@@ -4936,7 +5013,7 @@
           <a:p>
             <a:pPr algn="ctr"/>
             <a:r>
-              <a:rPr lang="EN-US"/>
+              <a:rPr lang="en-US"/>
               <a:t>Target Audience</a:t>
             </a:r>
             <a:br>
@@ -4964,20 +5041,16 @@
           <a:lstStyle/>
           <a:p>
             <a:r>
-              <a:rPr lang="EN-US">
+              <a:rPr lang="en-US">
                 <a:latin typeface="Century Schoolbook"/>
                 <a:sym typeface="Wingdings 2"/>
               </a:rPr>
               <a:t>Gender: Male &amp; Female </a:t>
             </a:r>
-            <a:endParaRPr lang="en-US">
-              <a:latin typeface="Century Schoolbook"/>
-              <a:sym typeface="Wingdings 2"/>
-            </a:endParaRPr>
-          </a:p>
-          <a:p>
-            <a:r>
-              <a:rPr lang="EN-US">
+          </a:p>
+          <a:p>
+            <a:r>
+              <a:rPr lang="en-US">
                 <a:latin typeface="Century Schoolbook"/>
                 <a:sym typeface="Wingdings 2"/>
               </a:rPr>
@@ -4986,21 +5059,17 @@
           </a:p>
           <a:p>
             <a:r>
-              <a:rPr lang="EN-US">
+              <a:rPr lang="en-US">
                 <a:latin typeface="Century Schoolbook"/>
                 <a:sym typeface="Wingdings 2"/>
               </a:rPr>
               <a:t>General interests in: </a:t>
             </a:r>
-            <a:endParaRPr lang="en-US">
-              <a:latin typeface="Century Schoolbook"/>
-              <a:sym typeface="Wingdings 2"/>
-            </a:endParaRPr>
           </a:p>
           <a:p>
             <a:pPr lvl="1"/>
             <a:r>
-              <a:rPr lang="EN-US">
+              <a:rPr lang="en-US">
                 <a:solidFill>
                   <a:srgbClr val="6F6F74"/>
                 </a:solidFill>
@@ -5010,7 +5079,7 @@
               <a:t></a:t>
             </a:r>
             <a:r>
-              <a:rPr lang="EN-US">
+              <a:rPr lang="en-US">
                 <a:solidFill>
                   <a:schemeClr val="tx1"/>
                 </a:solidFill>
@@ -5023,7 +5092,7 @@
           <a:p>
             <a:pPr lvl="1"/>
             <a:r>
-              <a:rPr lang="EN-US">
+              <a:rPr lang="en-US">
                 <a:solidFill>
                   <a:srgbClr val="6F6F74"/>
                 </a:solidFill>
@@ -5033,7 +5102,7 @@
               <a:t></a:t>
             </a:r>
             <a:r>
-              <a:rPr lang="EN-US">
+              <a:rPr lang="en-US">
                 <a:solidFill>
                   <a:schemeClr val="tx1"/>
                 </a:solidFill>
@@ -5046,7 +5115,7 @@
           <a:p>
             <a:pPr lvl="1"/>
             <a:r>
-              <a:rPr lang="EN-US">
+              <a:rPr lang="en-US">
                 <a:solidFill>
                   <a:srgbClr val="6F6F74"/>
                 </a:solidFill>
@@ -5056,7 +5125,7 @@
               <a:t></a:t>
             </a:r>
             <a:r>
-              <a:rPr lang="EN-US">
+              <a:rPr lang="en-US">
                 <a:solidFill>
                   <a:schemeClr val="tx1"/>
                 </a:solidFill>
@@ -5109,13 +5178,20 @@
     </p:spTree>
     <p:extLst>
       <p:ext uri="{BB962C8B-B14F-4D97-AF65-F5344CB8AC3E}">
-        <p14:creationId xmlns:p14="http://schemas.microsoft.com/office/powerpoint/2010/main" val="2763253167"/>
+        <p14:creationId xmlns:p14="http://schemas.microsoft.com/office/powerpoint/2010/main" xmlns="" val="2763253167"/>
       </p:ext>
     </p:extLst>
   </p:cSld>
   <p:clrMapOvr>
     <a:masterClrMapping/>
   </p:clrMapOvr>
+  <p:timing>
+    <p:tnLst>
+      <p:par>
+        <p:cTn id="1" dur="indefinite" restart="never" nodeType="tmRoot"/>
+      </p:par>
+    </p:tnLst>
+  </p:timing>
 </p:sld>
 </file>
 
@@ -5154,14 +5230,22 @@
           <a:lstStyle/>
           <a:p>
             <a:pPr algn="ctr"/>
+            <a:r>
+              <a:rPr lang="en-US"/>
+              <a:t/>
+            </a:r>
             <a:br>
               <a:rPr lang="en-US"/>
             </a:br>
+            <a:r>
+              <a:rPr lang="en-US"/>
+              <a:t/>
+            </a:r>
             <a:br>
               <a:rPr lang="en-US"/>
             </a:br>
             <a:r>
-              <a:rPr lang="EN-US"/>
+              <a:rPr lang="en-US"/>
               <a:t>Platform</a:t>
             </a:r>
             <a:br>
@@ -5189,42 +5273,31 @@
           <a:lstStyle/>
           <a:p>
             <a:r>
-              <a:rPr lang="EN-US"/>
+              <a:rPr lang="en-US"/>
               <a:t>Our game will be on a PC. </a:t>
             </a:r>
-            <a:endParaRPr lang="en-US"/>
           </a:p>
           <a:p>
             <a:pPr lvl="1"/>
             <a:r>
-              <a:rPr lang="EN-US">
+              <a:rPr lang="en-US">
                 <a:solidFill>
                   <a:schemeClr val="tx1"/>
                 </a:solidFill>
               </a:rPr>
               <a:t>Mac, Linux and Windows. </a:t>
             </a:r>
-            <a:endParaRPr lang="en-US">
-              <a:solidFill>
-                <a:schemeClr val="tx1"/>
-              </a:solidFill>
-            </a:endParaRPr>
           </a:p>
           <a:p>
             <a:pPr lvl="1"/>
             <a:r>
-              <a:rPr lang="EN-US">
+              <a:rPr lang="en-US">
                 <a:solidFill>
                   <a:schemeClr val="tx1"/>
                 </a:solidFill>
               </a:rPr>
               <a:t>Selling on average for £5.00 </a:t>
             </a:r>
-            <a:endParaRPr lang="en-US">
-              <a:solidFill>
-                <a:schemeClr val="tx1"/>
-              </a:solidFill>
-            </a:endParaRPr>
           </a:p>
         </p:txBody>
       </p:sp>
@@ -5255,13 +5328,20 @@
     </p:spTree>
     <p:extLst>
       <p:ext uri="{BB962C8B-B14F-4D97-AF65-F5344CB8AC3E}">
-        <p14:creationId xmlns:p14="http://schemas.microsoft.com/office/powerpoint/2010/main" val="419236589"/>
+        <p14:creationId xmlns:p14="http://schemas.microsoft.com/office/powerpoint/2010/main" xmlns="" val="419236589"/>
       </p:ext>
     </p:extLst>
   </p:cSld>
   <p:clrMapOvr>
     <a:masterClrMapping/>
   </p:clrMapOvr>
+  <p:timing>
+    <p:tnLst>
+      <p:par>
+        <p:cTn id="1" dur="indefinite" restart="never" nodeType="tmRoot"/>
+      </p:par>
+    </p:tnLst>
+  </p:timing>
 </p:sld>
 </file>
 
@@ -5299,10 +5379,9 @@
           <a:p>
             <a:pPr algn="ctr"/>
             <a:r>
-              <a:rPr lang="EN-US"/>
+              <a:rPr lang="en-US"/>
               <a:t>Logline </a:t>
             </a:r>
-            <a:endParaRPr lang="en-US"/>
           </a:p>
         </p:txBody>
       </p:sp>
@@ -5327,7 +5406,7 @@
               <a:buNone/>
             </a:pPr>
             <a:r>
-              <a:rPr lang="EN-US"/>
+              <a:rPr lang="en-US"/>
               <a:t>The player must endure mundane everyday office tasks and allow their curiosity to take over and reveal the secret of his company.</a:t>
             </a:r>
           </a:p>
@@ -5360,13 +5439,20 @@
     </p:spTree>
     <p:extLst>
       <p:ext uri="{BB962C8B-B14F-4D97-AF65-F5344CB8AC3E}">
-        <p14:creationId xmlns:p14="http://schemas.microsoft.com/office/powerpoint/2010/main" val="2554325826"/>
+        <p14:creationId xmlns:p14="http://schemas.microsoft.com/office/powerpoint/2010/main" xmlns="" val="2554325826"/>
       </p:ext>
     </p:extLst>
   </p:cSld>
   <p:clrMapOvr>
     <a:masterClrMapping/>
   </p:clrMapOvr>
+  <p:timing>
+    <p:tnLst>
+      <p:par>
+        <p:cTn id="1" dur="indefinite" restart="never" nodeType="tmRoot"/>
+      </p:par>
+    </p:tnLst>
+  </p:timing>
 </p:sld>
 </file>
 
@@ -5409,13 +5495,13 @@
           <a:p>
             <a:pPr algn="ctr"/>
             <a:r>
-              <a:rPr lang="EN-US" err="1">
+              <a:rPr lang="en-US" err="1">
                 <a:latin typeface="Calibri Light"/>
               </a:rPr>
               <a:t>Liberosis</a:t>
             </a:r>
             <a:r>
-              <a:rPr lang="EN-US">
+              <a:rPr lang="en-US">
                 <a:latin typeface="Calibri Light"/>
               </a:rPr>
               <a:t> and Monachopsis</a:t>
@@ -5449,15 +5535,18 @@
               <a:buNone/>
             </a:pPr>
             <a:r>
-              <a:rPr lang="EN-US" b="1" err="1">
+              <a:rPr lang="en-US" b="1" dirty="0" err="1">
                 <a:latin typeface="Century Schoolbook"/>
               </a:rPr>
               <a:t>Liberosis</a:t>
             </a:r>
-          </a:p>
-          <a:p>
-            <a:r>
-              <a:rPr lang="EN-US">
+            <a:endParaRPr lang="en-US" b="1" dirty="0">
+              <a:latin typeface="Century Schoolbook"/>
+            </a:endParaRPr>
+          </a:p>
+          <a:p>
+            <a:r>
+              <a:rPr lang="en-US" dirty="0">
                 <a:solidFill>
                   <a:srgbClr val="6F6F74"/>
                 </a:solidFill>
@@ -5466,70 +5555,386 @@
               <a:t>•</a:t>
             </a:r>
             <a:r>
-              <a:rPr lang="EN-US">
+              <a:rPr lang="en-US" dirty="0">
                 <a:latin typeface="Cambria"/>
               </a:rPr>
               <a:t>”</a:t>
             </a:r>
             <a:r>
-              <a:rPr lang="EN-US"/>
+              <a:rPr lang="en-US" dirty="0"/>
               <a:t>The desire to care less about things”</a:t>
             </a:r>
           </a:p>
           <a:p>
             <a:r>
-              <a:rPr lang="EN-US"/>
+              <a:rPr lang="en-US" dirty="0"/>
               <a:t>Boring tasks</a:t>
             </a:r>
           </a:p>
           <a:p>
             <a:r>
-              <a:rPr lang="EN-US"/>
-              <a:t>Greyscale, plain office cubicle</a:t>
-            </a:r>
-          </a:p>
-          <a:p>
-            <a:endParaRPr lang="EN-US"/>
-          </a:p>
-          <a:p>
-            <a:endParaRPr lang="EN-US"/>
-          </a:p>
-        </p:txBody>
-      </p:sp>
-      <p:pic>
-        <p:nvPicPr>
-          <p:cNvPr id="4" name="Picture 3"/>
-          <p:cNvPicPr>
-            <a:picLocks noChangeAspect="1"/>
-          </p:cNvPicPr>
+              <a:rPr lang="en-US" dirty="0" err="1"/>
+              <a:t>Greyscale</a:t>
+            </a:r>
+            <a:r>
+              <a:rPr lang="en-US" dirty="0"/>
+              <a:t>, plain office cubicle</a:t>
+            </a:r>
+          </a:p>
+          <a:p>
+            <a:endParaRPr lang="en-US" dirty="0"/>
+          </a:p>
+          <a:p>
+            <a:endParaRPr lang="en-US" dirty="0"/>
+          </a:p>
+        </p:txBody>
+      </p:sp>
+      <p:sp>
+        <p:nvSpPr>
+          <p:cNvPr id="5" name="Content Placeholder 2"/>
+          <p:cNvSpPr txBox="1">
+            <a:spLocks/>
+          </p:cNvSpPr>
           <p:nvPr/>
-        </p:nvPicPr>
-        <p:blipFill>
-          <a:blip r:embed="rId3"/>
-          <a:stretch>
-            <a:fillRect/>
-          </a:stretch>
-        </p:blipFill>
+        </p:nvSpPr>
         <p:spPr>
           <a:xfrm>
-            <a:off x="5470575" y="1819275"/>
-            <a:ext cx="5132717" cy="4981755"/>
+            <a:off x="5560015" y="1941830"/>
+            <a:ext cx="4497178" cy="4351338"/>
           </a:xfrm>
           <a:prstGeom prst="rect">
             <a:avLst/>
           </a:prstGeom>
         </p:spPr>
-      </p:pic>
+        <p:txBody>
+          <a:bodyPr vert="horz" lIns="91440" tIns="45720" rIns="91440" bIns="45720" rtlCol="0" anchor="t">
+            <a:normAutofit/>
+          </a:bodyPr>
+          <a:lstStyle/>
+          <a:p>
+            <a:pPr marL="0" marR="0" lvl="0" indent="0" algn="l" defTabSz="914400" rtl="0" eaLnBrk="1" fontAlgn="auto" latinLnBrk="0" hangingPunct="1">
+              <a:lnSpc>
+                <a:spcPct val="95000"/>
+              </a:lnSpc>
+              <a:spcBef>
+                <a:spcPts val="1400"/>
+              </a:spcBef>
+              <a:spcAft>
+                <a:spcPts val="200"/>
+              </a:spcAft>
+              <a:buClr>
+                <a:schemeClr val="accent1"/>
+              </a:buClr>
+              <a:buSzPct val="80000"/>
+              <a:buFont typeface="Arial" pitchFamily="34" charset="0"/>
+              <a:buNone/>
+              <a:tabLst/>
+              <a:defRPr/>
+            </a:pPr>
+            <a:r>
+              <a:rPr kumimoji="0" lang="en-US" sz="1800" b="1" i="0" u="none" strike="noStrike" kern="1200" cap="none" spc="10" normalizeH="0" baseline="0" noProof="0" dirty="0" err="1" smtClean="0">
+                <a:ln>
+                  <a:noFill/>
+                </a:ln>
+                <a:solidFill>
+                  <a:schemeClr val="tx1"/>
+                </a:solidFill>
+                <a:effectLst/>
+                <a:uLnTx/>
+                <a:uFillTx/>
+                <a:latin typeface="Century Schoolbook"/>
+                <a:ea typeface="+mn-ea"/>
+                <a:cs typeface="+mn-cs"/>
+              </a:rPr>
+              <a:t>Monachopsis</a:t>
+            </a:r>
+            <a:endParaRPr kumimoji="0" lang="en-US" sz="1800" b="1" i="0" u="none" strike="noStrike" kern="1200" cap="none" spc="10" normalizeH="0" baseline="0" noProof="0" dirty="0" smtClean="0">
+              <a:ln>
+                <a:noFill/>
+              </a:ln>
+              <a:solidFill>
+                <a:schemeClr val="tx1"/>
+              </a:solidFill>
+              <a:effectLst/>
+              <a:uLnTx/>
+              <a:uFillTx/>
+              <a:latin typeface="Century Schoolbook"/>
+              <a:ea typeface="+mn-ea"/>
+              <a:cs typeface="+mn-cs"/>
+            </a:endParaRPr>
+          </a:p>
+          <a:p>
+            <a:pPr marL="182880" marR="0" lvl="0" indent="-182880" algn="l" defTabSz="914400" rtl="0" eaLnBrk="1" fontAlgn="auto" latinLnBrk="0" hangingPunct="1">
+              <a:lnSpc>
+                <a:spcPct val="95000"/>
+              </a:lnSpc>
+              <a:spcBef>
+                <a:spcPts val="1400"/>
+              </a:spcBef>
+              <a:spcAft>
+                <a:spcPts val="200"/>
+              </a:spcAft>
+              <a:buClr>
+                <a:schemeClr val="accent1"/>
+              </a:buClr>
+              <a:buSzPct val="80000"/>
+              <a:buFont typeface="Arial" pitchFamily="34" charset="0"/>
+              <a:buChar char="•"/>
+              <a:tabLst/>
+              <a:defRPr/>
+            </a:pPr>
+            <a:r>
+              <a:rPr kumimoji="0" lang="en-US" sz="1800" b="0" i="0" u="none" strike="noStrike" kern="1200" cap="none" spc="10" normalizeH="0" baseline="0" noProof="0" dirty="0" smtClean="0">
+                <a:ln>
+                  <a:noFill/>
+                </a:ln>
+                <a:solidFill>
+                  <a:srgbClr val="6F6F74"/>
+                </a:solidFill>
+                <a:effectLst/>
+                <a:uLnTx/>
+                <a:uFillTx/>
+                <a:latin typeface="Arial"/>
+                <a:ea typeface="+mn-ea"/>
+                <a:cs typeface="+mn-cs"/>
+              </a:rPr>
+              <a:t>•</a:t>
+            </a:r>
+            <a:r>
+              <a:rPr kumimoji="0" lang="en-US" sz="1800" b="0" i="0" u="none" strike="noStrike" kern="1200" cap="none" spc="10" normalizeH="0" baseline="0" noProof="0" dirty="0" smtClean="0">
+                <a:ln>
+                  <a:noFill/>
+                </a:ln>
+                <a:solidFill>
+                  <a:schemeClr val="tx1"/>
+                </a:solidFill>
+                <a:effectLst/>
+                <a:uLnTx/>
+                <a:uFillTx/>
+                <a:latin typeface="Cambria"/>
+                <a:ea typeface="+mn-ea"/>
+                <a:cs typeface="+mn-cs"/>
+              </a:rPr>
+              <a:t>”</a:t>
+            </a:r>
+            <a:r>
+              <a:rPr kumimoji="0" lang="en-US" sz="1800" b="0" i="0" u="none" strike="noStrike" kern="1200" cap="none" spc="10" normalizeH="0" baseline="0" noProof="0" dirty="0" smtClean="0">
+                <a:ln>
+                  <a:noFill/>
+                </a:ln>
+                <a:solidFill>
+                  <a:schemeClr val="tx1"/>
+                </a:solidFill>
+                <a:effectLst/>
+                <a:uLnTx/>
+                <a:uFillTx/>
+                <a:latin typeface="+mn-lt"/>
+                <a:ea typeface="+mn-ea"/>
+                <a:cs typeface="+mn-cs"/>
+              </a:rPr>
+              <a:t>The subtle but persistent</a:t>
+            </a:r>
+            <a:r>
+              <a:rPr kumimoji="0" lang="en-US" sz="1800" b="0" i="0" u="none" strike="noStrike" kern="1200" cap="none" spc="10" normalizeH="0" noProof="0" dirty="0" smtClean="0">
+                <a:ln>
+                  <a:noFill/>
+                </a:ln>
+                <a:solidFill>
+                  <a:schemeClr val="tx1"/>
+                </a:solidFill>
+                <a:effectLst/>
+                <a:uLnTx/>
+                <a:uFillTx/>
+                <a:latin typeface="+mn-lt"/>
+                <a:ea typeface="+mn-ea"/>
+                <a:cs typeface="+mn-cs"/>
+              </a:rPr>
+              <a:t> feeling of being out of place.</a:t>
+            </a:r>
+            <a:r>
+              <a:rPr kumimoji="0" lang="en-US" sz="1800" b="0" i="0" u="none" strike="noStrike" kern="1200" cap="none" spc="10" normalizeH="0" baseline="0" noProof="0" dirty="0" smtClean="0">
+                <a:ln>
+                  <a:noFill/>
+                </a:ln>
+                <a:solidFill>
+                  <a:schemeClr val="tx1"/>
+                </a:solidFill>
+                <a:effectLst/>
+                <a:uLnTx/>
+                <a:uFillTx/>
+                <a:latin typeface="+mn-lt"/>
+                <a:ea typeface="+mn-ea"/>
+                <a:cs typeface="+mn-cs"/>
+              </a:rPr>
+              <a:t>”</a:t>
+            </a:r>
+          </a:p>
+          <a:p>
+            <a:pPr marL="182880" marR="0" lvl="0" indent="-182880" algn="l" defTabSz="914400" rtl="0" eaLnBrk="1" fontAlgn="auto" latinLnBrk="0" hangingPunct="1">
+              <a:lnSpc>
+                <a:spcPct val="95000"/>
+              </a:lnSpc>
+              <a:spcBef>
+                <a:spcPts val="1400"/>
+              </a:spcBef>
+              <a:spcAft>
+                <a:spcPts val="200"/>
+              </a:spcAft>
+              <a:buClr>
+                <a:schemeClr val="accent1"/>
+              </a:buClr>
+              <a:buSzPct val="80000"/>
+              <a:buFont typeface="Arial" pitchFamily="34" charset="0"/>
+              <a:buChar char="•"/>
+              <a:tabLst/>
+              <a:defRPr/>
+            </a:pPr>
+            <a:r>
+              <a:rPr lang="en-US" spc="10" dirty="0" smtClean="0"/>
+              <a:t>Seeing things that are out of place</a:t>
+            </a:r>
+            <a:endParaRPr kumimoji="0" lang="en-US" sz="1800" b="0" i="0" u="none" strike="noStrike" kern="1200" cap="none" spc="10" normalizeH="0" baseline="0" noProof="0" dirty="0" smtClean="0">
+              <a:ln>
+                <a:noFill/>
+              </a:ln>
+              <a:solidFill>
+                <a:schemeClr val="tx1"/>
+              </a:solidFill>
+              <a:effectLst/>
+              <a:uLnTx/>
+              <a:uFillTx/>
+              <a:latin typeface="+mn-lt"/>
+              <a:ea typeface="+mn-ea"/>
+              <a:cs typeface="+mn-cs"/>
+            </a:endParaRPr>
+          </a:p>
+          <a:p>
+            <a:pPr marL="182880" marR="0" lvl="0" indent="-182880" algn="l" defTabSz="914400" rtl="0" eaLnBrk="1" fontAlgn="auto" latinLnBrk="0" hangingPunct="1">
+              <a:lnSpc>
+                <a:spcPct val="95000"/>
+              </a:lnSpc>
+              <a:spcBef>
+                <a:spcPts val="1400"/>
+              </a:spcBef>
+              <a:spcAft>
+                <a:spcPts val="200"/>
+              </a:spcAft>
+              <a:buClr>
+                <a:schemeClr val="accent1"/>
+              </a:buClr>
+              <a:buSzPct val="80000"/>
+              <a:buFont typeface="Arial" pitchFamily="34" charset="0"/>
+              <a:buChar char="•"/>
+              <a:tabLst/>
+              <a:defRPr/>
+            </a:pPr>
+            <a:r>
+              <a:rPr kumimoji="0" lang="en-US" sz="1800" b="0" i="0" u="none" strike="noStrike" kern="1200" cap="none" spc="10" normalizeH="0" baseline="0" noProof="0" dirty="0" smtClean="0">
+                <a:ln>
+                  <a:noFill/>
+                </a:ln>
+                <a:solidFill>
+                  <a:schemeClr val="tx1"/>
+                </a:solidFill>
+                <a:effectLst/>
+                <a:uLnTx/>
+                <a:uFillTx/>
+                <a:latin typeface="+mn-lt"/>
+                <a:ea typeface="+mn-ea"/>
+                <a:cs typeface="+mn-cs"/>
+              </a:rPr>
+              <a:t>More and more incongruous items appear over the course of the game</a:t>
+            </a:r>
+          </a:p>
+          <a:p>
+            <a:pPr marL="182880" marR="0" lvl="0" indent="-182880" algn="l" defTabSz="914400" rtl="0" eaLnBrk="1" fontAlgn="auto" latinLnBrk="0" hangingPunct="1">
+              <a:lnSpc>
+                <a:spcPct val="95000"/>
+              </a:lnSpc>
+              <a:spcBef>
+                <a:spcPts val="1400"/>
+              </a:spcBef>
+              <a:spcAft>
+                <a:spcPts val="200"/>
+              </a:spcAft>
+              <a:buClr>
+                <a:schemeClr val="accent1"/>
+              </a:buClr>
+              <a:buSzPct val="80000"/>
+              <a:buFont typeface="Arial" pitchFamily="34" charset="0"/>
+              <a:buChar char="•"/>
+              <a:tabLst/>
+              <a:defRPr/>
+            </a:pPr>
+            <a:endParaRPr kumimoji="0" lang="en-US" sz="1800" b="0" i="0" u="none" strike="noStrike" kern="1200" cap="none" spc="10" normalizeH="0" baseline="0" noProof="0" dirty="0" smtClean="0">
+              <a:ln>
+                <a:noFill/>
+              </a:ln>
+              <a:solidFill>
+                <a:schemeClr val="tx1"/>
+              </a:solidFill>
+              <a:effectLst/>
+              <a:uLnTx/>
+              <a:uFillTx/>
+              <a:latin typeface="+mn-lt"/>
+              <a:ea typeface="+mn-ea"/>
+              <a:cs typeface="+mn-cs"/>
+            </a:endParaRPr>
+          </a:p>
+          <a:p>
+            <a:pPr marL="182880" marR="0" lvl="0" indent="-182880" algn="l" defTabSz="914400" rtl="0" eaLnBrk="1" fontAlgn="auto" latinLnBrk="0" hangingPunct="1">
+              <a:lnSpc>
+                <a:spcPct val="95000"/>
+              </a:lnSpc>
+              <a:spcBef>
+                <a:spcPts val="1400"/>
+              </a:spcBef>
+              <a:spcAft>
+                <a:spcPts val="200"/>
+              </a:spcAft>
+              <a:buClr>
+                <a:schemeClr val="accent1"/>
+              </a:buClr>
+              <a:buSzPct val="80000"/>
+              <a:buFont typeface="Arial" pitchFamily="34" charset="0"/>
+              <a:buChar char="•"/>
+              <a:tabLst/>
+              <a:defRPr/>
+            </a:pPr>
+            <a:endParaRPr kumimoji="0" lang="en-US" sz="1800" b="0" i="0" u="none" strike="noStrike" kern="1200" cap="none" spc="10" normalizeH="0" baseline="0" noProof="0" dirty="0">
+              <a:ln>
+                <a:noFill/>
+              </a:ln>
+              <a:solidFill>
+                <a:schemeClr val="tx1"/>
+              </a:solidFill>
+              <a:effectLst/>
+              <a:uLnTx/>
+              <a:uFillTx/>
+              <a:latin typeface="+mn-lt"/>
+              <a:ea typeface="+mn-ea"/>
+              <a:cs typeface="+mn-cs"/>
+            </a:endParaRPr>
+          </a:p>
+        </p:txBody>
+      </p:sp>
     </p:spTree>
     <p:extLst>
       <p:ext uri="{BB962C8B-B14F-4D97-AF65-F5344CB8AC3E}">
-        <p14:creationId xmlns:p14="http://schemas.microsoft.com/office/powerpoint/2010/main" val="3805906831"/>
+        <p14:creationId xmlns:p14="http://schemas.microsoft.com/office/powerpoint/2010/main" xmlns="" val="3805906831"/>
       </p:ext>
     </p:extLst>
   </p:cSld>
   <p:clrMapOvr>
     <a:masterClrMapping/>
   </p:clrMapOvr>
+  <p:timing>
+    <p:tnLst>
+      <p:par>
+        <p:cTn id="1" dur="indefinite" restart="never" nodeType="tmRoot"/>
+      </p:par>
+    </p:tnLst>
+  </p:timing>
 </p:sld>
 </file>
 
@@ -5566,10 +5971,9 @@
           <a:lstStyle/>
           <a:p>
             <a:r>
-              <a:rPr lang="EN-US"/>
+              <a:rPr lang="en-US"/>
               <a:t>The player experience </a:t>
             </a:r>
-            <a:endParaRPr lang="en-US"/>
           </a:p>
         </p:txBody>
       </p:sp>
@@ -5591,10 +5995,9 @@
           <a:lstStyle/>
           <a:p>
             <a:r>
-              <a:rPr lang="EN-US"/>
+              <a:rPr lang="en-US"/>
               <a:t>Over all what we want to try and make the player experience. </a:t>
             </a:r>
-            <a:endParaRPr lang="en-US"/>
           </a:p>
           <a:p>
             <a:pPr lvl="1"/>
@@ -5637,13 +6040,20 @@
     </p:spTree>
     <p:extLst>
       <p:ext uri="{BB962C8B-B14F-4D97-AF65-F5344CB8AC3E}">
-        <p14:creationId xmlns:p14="http://schemas.microsoft.com/office/powerpoint/2010/main" val="277214617"/>
+        <p14:creationId xmlns:p14="http://schemas.microsoft.com/office/powerpoint/2010/main" xmlns="" val="277214617"/>
       </p:ext>
     </p:extLst>
   </p:cSld>
   <p:clrMapOvr>
     <a:masterClrMapping/>
   </p:clrMapOvr>
+  <p:timing>
+    <p:tnLst>
+      <p:par>
+        <p:cTn id="1" dur="indefinite" restart="never" nodeType="tmRoot"/>
+      </p:par>
+    </p:tnLst>
+  </p:timing>
 </p:sld>
 </file>
 
@@ -5681,10 +6091,9 @@
           <a:p>
             <a:pPr algn="ctr"/>
             <a:r>
-              <a:rPr lang="EN-US"/>
+              <a:rPr lang="en-US"/>
               <a:t>Game mechanics </a:t>
             </a:r>
-            <a:endParaRPr lang="en-US"/>
           </a:p>
         </p:txBody>
       </p:sp>
@@ -5706,26 +6115,20 @@
           <a:lstStyle/>
           <a:p>
             <a:r>
-              <a:rPr lang="EN-US"/>
+              <a:rPr lang="en-US" dirty="0"/>
               <a:t>3D Point and click </a:t>
             </a:r>
-            <a:endParaRPr lang="en-US"/>
           </a:p>
           <a:p>
             <a:pPr lvl="1"/>
             <a:r>
-              <a:rPr lang="EN-US">
+              <a:rPr lang="en-US" dirty="0">
                 <a:solidFill>
                   <a:srgbClr val="000000"/>
                 </a:solidFill>
               </a:rPr>
               <a:t>Which focuses on a rhythm and repeat matching game. </a:t>
             </a:r>
-            <a:endParaRPr lang="en-US">
-              <a:solidFill>
-                <a:srgbClr val="000000"/>
-              </a:solidFill>
-            </a:endParaRPr>
           </a:p>
         </p:txBody>
       </p:sp>
@@ -5756,13 +6159,20 @@
     </p:spTree>
     <p:extLst>
       <p:ext uri="{BB962C8B-B14F-4D97-AF65-F5344CB8AC3E}">
-        <p14:creationId xmlns:p14="http://schemas.microsoft.com/office/powerpoint/2010/main" val="1307950703"/>
+        <p14:creationId xmlns:p14="http://schemas.microsoft.com/office/powerpoint/2010/main" xmlns="" val="1307950703"/>
       </p:ext>
     </p:extLst>
   </p:cSld>
   <p:clrMapOvr>
     <a:masterClrMapping/>
   </p:clrMapOvr>
+  <p:timing>
+    <p:tnLst>
+      <p:par>
+        <p:cTn id="1" dur="indefinite" restart="never" nodeType="tmRoot"/>
+      </p:par>
+    </p:tnLst>
+  </p:timing>
 </p:sld>
 </file>
 
@@ -5799,10 +6209,9 @@
           <a:lstStyle/>
           <a:p>
             <a:r>
-              <a:rPr lang="EN-US"/>
+              <a:rPr lang="en-US"/>
               <a:t>Structure and rewards. </a:t>
             </a:r>
-            <a:endParaRPr lang="en-US"/>
           </a:p>
         </p:txBody>
       </p:sp>
@@ -5824,42 +6233,31 @@
           <a:lstStyle/>
           <a:p>
             <a:r>
-              <a:rPr lang="EN-US"/>
+              <a:rPr lang="en-US"/>
               <a:t>Player will completes stages </a:t>
             </a:r>
-            <a:endParaRPr lang="en-US"/>
           </a:p>
           <a:p>
             <a:pPr lvl="1"/>
             <a:r>
-              <a:rPr lang="EN-US">
+              <a:rPr lang="en-US">
                 <a:solidFill>
                   <a:schemeClr val="tx1"/>
                 </a:solidFill>
               </a:rPr>
               <a:t>Then the player will be rewarded with hint at the games narrative. </a:t>
             </a:r>
-            <a:endParaRPr lang="en-US">
-              <a:solidFill>
-                <a:schemeClr val="tx1"/>
-              </a:solidFill>
-            </a:endParaRPr>
           </a:p>
           <a:p>
             <a:pPr lvl="1"/>
             <a:r>
-              <a:rPr lang="EN-US">
+              <a:rPr lang="en-US">
                 <a:solidFill>
                   <a:schemeClr val="tx1"/>
                 </a:solidFill>
               </a:rPr>
               <a:t>The will repeat this until completions. </a:t>
             </a:r>
-            <a:endParaRPr lang="en-US">
-              <a:solidFill>
-                <a:schemeClr val="tx1"/>
-              </a:solidFill>
-            </a:endParaRPr>
           </a:p>
         </p:txBody>
       </p:sp>
@@ -5890,13 +6288,20 @@
     </p:spTree>
     <p:extLst>
       <p:ext uri="{BB962C8B-B14F-4D97-AF65-F5344CB8AC3E}">
-        <p14:creationId xmlns:p14="http://schemas.microsoft.com/office/powerpoint/2010/main" val="494434673"/>
+        <p14:creationId xmlns:p14="http://schemas.microsoft.com/office/powerpoint/2010/main" xmlns="" val="494434673"/>
       </p:ext>
     </p:extLst>
   </p:cSld>
   <p:clrMapOvr>
     <a:masterClrMapping/>
   </p:clrMapOvr>
+  <p:timing>
+    <p:tnLst>
+      <p:par>
+        <p:cTn id="1" dur="indefinite" restart="never" nodeType="tmRoot"/>
+      </p:par>
+    </p:tnLst>
+  </p:timing>
 </p:sld>
 </file>
 
@@ -5927,30 +6332,67 @@
             <p:ph type="title"/>
           </p:nvPr>
         </p:nvSpPr>
-        <p:spPr/>
+        <p:spPr>
+          <a:xfrm>
+            <a:off x="1261872" y="241300"/>
+            <a:ext cx="9692640" cy="751522"/>
+          </a:xfrm>
+        </p:spPr>
         <p:txBody>
           <a:bodyPr/>
           <a:lstStyle/>
           <a:p>
             <a:pPr algn="ctr"/>
             <a:r>
-              <a:rPr lang="EN-US"/>
+              <a:rPr lang="en-US" dirty="0"/>
               <a:t>Prototype</a:t>
             </a:r>
-            <a:endParaRPr lang="en-US"/>
-          </a:p>
-        </p:txBody>
-      </p:sp>
+          </a:p>
+        </p:txBody>
+      </p:sp>
+      <p:pic>
+        <p:nvPicPr>
+          <p:cNvPr id="1026" name="Picture 2" descr="C:\Users\Connor\Desktop\first-semester-l4-5-group-15\Managment\Initial presentation GIF1.gif"/>
+          <p:cNvPicPr>
+            <a:picLocks noChangeAspect="1" noChangeArrowheads="1" noCrop="1"/>
+          </p:cNvPicPr>
+          <p:nvPr/>
+        </p:nvPicPr>
+        <p:blipFill>
+          <a:blip r:embed="rId3"/>
+          <a:srcRect/>
+          <a:stretch>
+            <a:fillRect/>
+          </a:stretch>
+        </p:blipFill>
+        <p:spPr bwMode="auto">
+          <a:xfrm>
+            <a:off x="546099" y="1259544"/>
+            <a:ext cx="10439401" cy="4700615"/>
+          </a:xfrm>
+          <a:prstGeom prst="rect">
+            <a:avLst/>
+          </a:prstGeom>
+          <a:noFill/>
+        </p:spPr>
+      </p:pic>
     </p:spTree>
     <p:extLst>
       <p:ext uri="{BB962C8B-B14F-4D97-AF65-F5344CB8AC3E}">
-        <p14:creationId xmlns:p14="http://schemas.microsoft.com/office/powerpoint/2010/main" val="173328931"/>
+        <p14:creationId xmlns:p14="http://schemas.microsoft.com/office/powerpoint/2010/main" xmlns="" val="173328931"/>
       </p:ext>
     </p:extLst>
   </p:cSld>
   <p:clrMapOvr>
     <a:masterClrMapping/>
   </p:clrMapOvr>
+  <p:timing>
+    <p:tnLst>
+      <p:par>
+        <p:cTn id="1" dur="indefinite" restart="never" nodeType="tmRoot"/>
+      </p:par>
+    </p:tnLst>
+  </p:timing>
 </p:sld>
 </file>
 
@@ -5997,7 +6439,7 @@
     </a:clrScheme>
     <a:fontScheme name="View">
       <a:majorFont>
-        <a:latin typeface="Century Schoolbook" panose="02040604050505020304"/>
+        <a:latin typeface="Century Schoolbook"/>
         <a:ea typeface=""/>
         <a:cs typeface=""/>
         <a:font script="Jpan" typeface="ＭＳ ゴシック"/>
@@ -6032,7 +6474,7 @@
         <a:font script="Geor" typeface="Sylfaen"/>
       </a:majorFont>
       <a:minorFont>
-        <a:latin typeface="Century Schoolbook" panose="02040604050505020304"/>
+        <a:latin typeface="Century Schoolbook"/>
         <a:ea typeface=""/>
         <a:cs typeface=""/>
         <a:font script="Jpan" typeface="ＭＳ ゴシック"/>
@@ -6201,7 +6643,7 @@
   <a:extraClrSchemeLst/>
   <a:extLst>
     <a:ext uri="{05A4C25C-085E-4340-85A3-A5531E510DB2}">
-      <thm15:themeFamily xmlns:thm15="http://schemas.microsoft.com/office/thememl/2012/main" name="View" id="{BA0EB5A6-F2D4-4F82-977B-64ADEE4A2A69}" vid="{3969A8A2-35DB-4E3B-8885-16FD20568674}"/>
+      <thm15:themeFamily xmlns:thm15="http://schemas.microsoft.com/office/thememl/2012/main" xmlns="" name="View" id="{BA0EB5A6-F2D4-4F82-977B-64ADEE4A2A69}" vid="{3969A8A2-35DB-4E3B-8885-16FD20568674}"/>
     </a:ext>
   </a:extLst>
 </a:theme>
@@ -6250,7 +6692,7 @@
     </a:clrScheme>
     <a:fontScheme name="Office">
       <a:majorFont>
-        <a:latin typeface="Calibri Light" panose="020F0302020204030204"/>
+        <a:latin typeface="Calibri Light"/>
         <a:ea typeface=""/>
         <a:cs typeface=""/>
         <a:font script="Jpan" typeface="游ゴシック Light"/>
@@ -6302,7 +6744,7 @@
         <a:font script="Tfng" typeface="Ebrima"/>
       </a:majorFont>
       <a:minorFont>
-        <a:latin typeface="Calibri" panose="020F0502020204030204"/>
+        <a:latin typeface="Calibri"/>
         <a:ea typeface=""/>
         <a:cs typeface=""/>
         <a:font script="Jpan" typeface="游ゴシック"/>
@@ -6496,7 +6938,7 @@
   <a:extraClrSchemeLst/>
   <a:extLst>
     <a:ext uri="{05A4C25C-085E-4340-85A3-A5531E510DB2}">
-      <thm15:themeFamily xmlns:thm15="http://schemas.microsoft.com/office/thememl/2012/main" name="Office Theme" id="{62F939B6-93AF-4DB8-9C6B-D6C7DFDC589F}" vid="{4A3C46E8-61CC-4603-A589-7422A47A8E4A}"/>
+      <thm15:themeFamily xmlns:thm15="http://schemas.microsoft.com/office/thememl/2012/main" xmlns="" name="Office Theme" id="{62F939B6-93AF-4DB8-9C6B-D6C7DFDC589F}" vid="{4A3C46E8-61CC-4603-A589-7422A47A8E4A}"/>
     </a:ext>
   </a:extLst>
 </a:theme>

</xml_diff>